<commit_message>
add presnation 09 and demo program for user interface
</commit_message>
<xml_diff>
--- a/Prezentace/PGM_05.pptx
+++ b/Prezentace/PGM_05.pptx
@@ -873,7 +873,7 @@
             <a:fld id="{B61BEF0D-F0BB-DE4B-95CE-6DB70DBA9567}" type="datetimeFigureOut">
               <a:rPr lang="en-US" dirty="0"/>
               <a:pPr/>
-              <a:t>10/13/2020</a:t>
+              <a:t>12/1/2020</a:t>
             </a:fld>
             <a:endParaRPr lang="en-US" dirty="0"/>
           </a:p>
@@ -1121,7 +1121,7 @@
             <a:fld id="{B61BEF0D-F0BB-DE4B-95CE-6DB70DBA9567}" type="datetimeFigureOut">
               <a:rPr lang="en-US" dirty="0"/>
               <a:pPr/>
-              <a:t>10/13/2020</a:t>
+              <a:t>12/1/2020</a:t>
             </a:fld>
             <a:endParaRPr lang="en-US" dirty="0"/>
           </a:p>
@@ -1432,7 +1432,7 @@
             <a:fld id="{B61BEF0D-F0BB-DE4B-95CE-6DB70DBA9567}" type="datetimeFigureOut">
               <a:rPr lang="en-US" dirty="0"/>
               <a:pPr/>
-              <a:t>10/13/2020</a:t>
+              <a:t>12/1/2020</a:t>
             </a:fld>
             <a:endParaRPr lang="en-US" dirty="0"/>
           </a:p>
@@ -1762,7 +1762,7 @@
             <a:fld id="{B61BEF0D-F0BB-DE4B-95CE-6DB70DBA9567}" type="datetimeFigureOut">
               <a:rPr lang="en-US" dirty="0"/>
               <a:pPr/>
-              <a:t>10/13/2020</a:t>
+              <a:t>12/1/2020</a:t>
             </a:fld>
             <a:endParaRPr lang="en-US" dirty="0"/>
           </a:p>
@@ -2073,7 +2073,7 @@
             <a:fld id="{B61BEF0D-F0BB-DE4B-95CE-6DB70DBA9567}" type="datetimeFigureOut">
               <a:rPr lang="en-US" dirty="0"/>
               <a:pPr/>
-              <a:t>10/13/2020</a:t>
+              <a:t>12/1/2020</a:t>
             </a:fld>
             <a:endParaRPr lang="en-US" dirty="0"/>
           </a:p>
@@ -2463,7 +2463,7 @@
             <a:fld id="{B61BEF0D-F0BB-DE4B-95CE-6DB70DBA9567}" type="datetimeFigureOut">
               <a:rPr lang="en-US" dirty="0"/>
               <a:pPr/>
-              <a:t>10/13/2020</a:t>
+              <a:t>12/1/2020</a:t>
             </a:fld>
             <a:endParaRPr lang="en-US" dirty="0"/>
           </a:p>
@@ -2629,7 +2629,7 @@
           <a:p>
             <a:fld id="{55C6B4A9-1611-4792-9094-5F34BCA07E0B}" type="datetimeFigureOut">
               <a:rPr lang="en-US" dirty="0"/>
-              <a:t>10/13/2020</a:t>
+              <a:t>12/1/2020</a:t>
             </a:fld>
             <a:endParaRPr lang="en-US" dirty="0"/>
           </a:p>
@@ -2805,7 +2805,7 @@
             <a:fld id="{B61BEF0D-F0BB-DE4B-95CE-6DB70DBA9567}" type="datetimeFigureOut">
               <a:rPr lang="en-US" dirty="0"/>
               <a:pPr/>
-              <a:t>10/13/2020</a:t>
+              <a:t>12/1/2020</a:t>
             </a:fld>
             <a:endParaRPr lang="en-US" dirty="0"/>
           </a:p>
@@ -2971,7 +2971,7 @@
           <a:p>
             <a:fld id="{42A54C80-263E-416B-A8E0-580EDEADCBDC}" type="datetimeFigureOut">
               <a:rPr lang="en-US" dirty="0"/>
-              <a:t>10/13/2020</a:t>
+              <a:t>12/1/2020</a:t>
             </a:fld>
             <a:endParaRPr lang="en-US" dirty="0"/>
           </a:p>
@@ -3214,7 +3214,7 @@
             <a:fld id="{B61BEF0D-F0BB-DE4B-95CE-6DB70DBA9567}" type="datetimeFigureOut">
               <a:rPr lang="en-US" dirty="0"/>
               <a:pPr/>
-              <a:t>10/13/2020</a:t>
+              <a:t>12/1/2020</a:t>
             </a:fld>
             <a:endParaRPr lang="en-US" dirty="0"/>
           </a:p>
@@ -3442,7 +3442,7 @@
           <a:p>
             <a:fld id="{42A54C80-263E-416B-A8E0-580EDEADCBDC}" type="datetimeFigureOut">
               <a:rPr lang="en-US" dirty="0"/>
-              <a:t>10/13/2020</a:t>
+              <a:t>12/1/2020</a:t>
             </a:fld>
             <a:endParaRPr lang="en-US" dirty="0"/>
           </a:p>
@@ -3812,7 +3812,7 @@
             <a:fld id="{B61BEF0D-F0BB-DE4B-95CE-6DB70DBA9567}" type="datetimeFigureOut">
               <a:rPr lang="en-US" dirty="0"/>
               <a:pPr/>
-              <a:t>10/13/2020</a:t>
+              <a:t>12/1/2020</a:t>
             </a:fld>
             <a:endParaRPr lang="en-US" dirty="0"/>
           </a:p>
@@ -3932,7 +3932,7 @@
             <a:fld id="{B61BEF0D-F0BB-DE4B-95CE-6DB70DBA9567}" type="datetimeFigureOut">
               <a:rPr lang="en-US" dirty="0"/>
               <a:pPr/>
-              <a:t>10/13/2020</a:t>
+              <a:t>12/1/2020</a:t>
             </a:fld>
             <a:endParaRPr lang="en-US" dirty="0"/>
           </a:p>
@@ -4024,7 +4024,7 @@
             <a:fld id="{B61BEF0D-F0BB-DE4B-95CE-6DB70DBA9567}" type="datetimeFigureOut">
               <a:rPr lang="en-US" dirty="0"/>
               <a:pPr/>
-              <a:t>10/13/2020</a:t>
+              <a:t>12/1/2020</a:t>
             </a:fld>
             <a:endParaRPr lang="en-US" dirty="0"/>
           </a:p>
@@ -4275,7 +4275,7 @@
           <a:p>
             <a:fld id="{42A54C80-263E-416B-A8E0-580EDEADCBDC}" type="datetimeFigureOut">
               <a:rPr lang="en-US" dirty="0"/>
-              <a:t>10/13/2020</a:t>
+              <a:t>12/1/2020</a:t>
             </a:fld>
             <a:endParaRPr lang="en-US" dirty="0"/>
           </a:p>
@@ -4577,7 +4577,7 @@
             <a:fld id="{B61BEF0D-F0BB-DE4B-95CE-6DB70DBA9567}" type="datetimeFigureOut">
               <a:rPr lang="en-US" dirty="0"/>
               <a:pPr/>
-              <a:t>10/13/2020</a:t>
+              <a:t>12/1/2020</a:t>
             </a:fld>
             <a:endParaRPr lang="en-US" dirty="0"/>
           </a:p>
@@ -5275,7 +5275,7 @@
             <a:fld id="{B61BEF0D-F0BB-DE4B-95CE-6DB70DBA9567}" type="datetimeFigureOut">
               <a:rPr lang="en-US" dirty="0"/>
               <a:pPr/>
-              <a:t>10/13/2020</a:t>
+              <a:t>12/1/2020</a:t>
             </a:fld>
             <a:endParaRPr lang="en-US" dirty="0"/>
           </a:p>
@@ -7195,7 +7195,7 @@
           <a:p>
             <a:r>
               <a:rPr lang="cs-CZ" dirty="0" err="1"/>
-              <a:t>Break</a:t>
+              <a:t>Brake</a:t>
             </a:r>
             <a:r>
               <a:rPr lang="cs-CZ" dirty="0"/>
@@ -7245,29 +7245,29 @@
               <a:t>brake</a:t>
             </a:r>
             <a:r>
+              <a:rPr lang="cs-CZ" b="1"/>
+              <a:t>; </a:t>
+            </a:r>
+            <a:r>
+              <a:rPr lang="cs-CZ" dirty="0"/>
+              <a:t>je ukončena obsluha kódu v konkrétním bloku a pokračuje se až za blokem</a:t>
+            </a:r>
+          </a:p>
+          <a:p>
+            <a:r>
+              <a:rPr lang="cs-CZ" dirty="0"/>
+              <a:t>Při dosažení příkazu </a:t>
+            </a:r>
+            <a:r>
+              <a:rPr lang="cs-CZ" b="1" dirty="0" err="1"/>
+              <a:t>continue</a:t>
+            </a:r>
+            <a:r>
               <a:rPr lang="cs-CZ" b="1" dirty="0"/>
               <a:t>; </a:t>
             </a:r>
             <a:r>
               <a:rPr lang="cs-CZ" dirty="0"/>
-              <a:t>je ukončena obsluha kódu v konkrétním bloku a pokračuje se až za blokem</a:t>
-            </a:r>
-          </a:p>
-          <a:p>
-            <a:r>
-              <a:rPr lang="cs-CZ" dirty="0"/>
-              <a:t>Při dosažení příkazu </a:t>
-            </a:r>
-            <a:r>
-              <a:rPr lang="cs-CZ" b="1" dirty="0" err="1"/>
-              <a:t>continue</a:t>
-            </a:r>
-            <a:r>
-              <a:rPr lang="cs-CZ" b="1" dirty="0"/>
-              <a:t>; </a:t>
-            </a:r>
-            <a:r>
-              <a:rPr lang="cs-CZ" dirty="0"/>
               <a:t>je přeskočen zbytek kódu v bloku a pokračuje se v následující iteraci</a:t>
             </a:r>
           </a:p>
@@ -7279,13 +7279,8 @@
             </a:r>
             <a:r>
               <a:rPr lang="cs-CZ" dirty="0"/>
-              <a:t> se nejčastěji objevují právě </a:t>
-            </a:r>
-            <a:r>
-              <a:rPr lang="cs-CZ"/>
-              <a:t>v cyklech</a:t>
-            </a:r>
-            <a:endParaRPr lang="cs-CZ" dirty="0"/>
+              <a:t> se nejčastěji objevují právě v cyklech</a:t>
+            </a:r>
           </a:p>
           <a:p>
             <a:endParaRPr lang="cs-CZ" dirty="0"/>

</xml_diff>